<commit_message>
Learning Machines for DECOVID
</commit_message>
<xml_diff>
--- a/doc/LM_Decovid.pptx
+++ b/doc/LM_Decovid.pptx
@@ -13,6 +13,9 @@
     <p:sldId id="261" r:id="rId7"/>
     <p:sldId id="264" r:id="rId8"/>
     <p:sldId id="266" r:id="rId9"/>
+    <p:sldId id="267" r:id="rId10"/>
+    <p:sldId id="268" r:id="rId11"/>
+    <p:sldId id="269" r:id="rId12"/>
   </p:sldIdLst>
   <p:sldSz cx="12192000" cy="6858000"/>
   <p:notesSz cx="6858000" cy="9144000"/>
@@ -6780,6 +6783,356 @@
     <p:extLst>
       <p:ext uri="{BB962C8B-B14F-4D97-AF65-F5344CB8AC3E}">
         <p14:creationId xmlns:p14="http://schemas.microsoft.com/office/powerpoint/2010/main" val="3971679452"/>
+      </p:ext>
+    </p:extLst>
+  </p:cSld>
+  <p:clrMapOvr>
+    <a:masterClrMapping/>
+  </p:clrMapOvr>
+</p:sld>
+</file>
+
+<file path=ppt/slides/slide10.xml><?xml version="1.0" encoding="utf-8"?>
+<p:sld xmlns:a="http://schemas.openxmlformats.org/drawingml/2006/main" xmlns:r="http://schemas.openxmlformats.org/officeDocument/2006/relationships" xmlns:p="http://schemas.openxmlformats.org/presentationml/2006/main">
+  <p:cSld>
+    <p:spTree>
+      <p:nvGrpSpPr>
+        <p:cNvPr id="1" name=""/>
+        <p:cNvGrpSpPr/>
+        <p:nvPr/>
+      </p:nvGrpSpPr>
+      <p:grpSpPr>
+        <a:xfrm>
+          <a:off x="0" y="0"/>
+          <a:ext cx="0" cy="0"/>
+          <a:chOff x="0" y="0"/>
+          <a:chExt cx="0" cy="0"/>
+        </a:xfrm>
+      </p:grpSpPr>
+      <p:sp>
+        <p:nvSpPr>
+          <p:cNvPr id="2" name="Title 1">
+            <a:extLst>
+              <a:ext uri="{FF2B5EF4-FFF2-40B4-BE49-F238E27FC236}">
+                <a16:creationId xmlns:a16="http://schemas.microsoft.com/office/drawing/2014/main" id="{7FE63D1F-404B-FD49-9733-825C0B5D6D5A}"/>
+              </a:ext>
+            </a:extLst>
+          </p:cNvPr>
+          <p:cNvSpPr>
+            <a:spLocks noGrp="1"/>
+          </p:cNvSpPr>
+          <p:nvPr>
+            <p:ph type="title"/>
+          </p:nvPr>
+        </p:nvSpPr>
+        <p:spPr/>
+        <p:txBody>
+          <a:bodyPr/>
+          <a:lstStyle/>
+          <a:p>
+            <a:r>
+              <a:rPr lang="en-GB" dirty="0"/>
+              <a:t>Reproducibility tooling</a:t>
+            </a:r>
+          </a:p>
+        </p:txBody>
+      </p:sp>
+      <p:sp>
+        <p:nvSpPr>
+          <p:cNvPr id="3" name="Content Placeholder 2">
+            <a:extLst>
+              <a:ext uri="{FF2B5EF4-FFF2-40B4-BE49-F238E27FC236}">
+                <a16:creationId xmlns:a16="http://schemas.microsoft.com/office/drawing/2014/main" id="{097C8D76-BA06-354F-8439-9DA1B4E5E238}"/>
+              </a:ext>
+            </a:extLst>
+          </p:cNvPr>
+          <p:cNvSpPr>
+            <a:spLocks noGrp="1"/>
+          </p:cNvSpPr>
+          <p:nvPr>
+            <p:ph idx="1"/>
+          </p:nvPr>
+        </p:nvSpPr>
+        <p:spPr>
+          <a:xfrm>
+            <a:off x="2589212" y="2133599"/>
+            <a:ext cx="8915400" cy="4604731"/>
+          </a:xfrm>
+        </p:spPr>
+        <p:txBody>
+          <a:bodyPr>
+            <a:normAutofit fontScale="70000" lnSpcReduction="20000"/>
+          </a:bodyPr>
+          <a:lstStyle/>
+          <a:p>
+            <a:pPr marL="0" indent="0" algn="ctr">
+              <a:buNone/>
+            </a:pPr>
+            <a:r>
+              <a:rPr lang="en-GB" sz="2800" i="1" dirty="0"/>
+              <a:t>How do we help the analysts to quickly identify problems reproducing their work?</a:t>
+            </a:r>
+          </a:p>
+          <a:p>
+            <a:endParaRPr lang="en-GB" sz="2200" dirty="0"/>
+          </a:p>
+          <a:p>
+            <a:pPr marL="0" indent="0">
+              <a:buNone/>
+            </a:pPr>
+            <a:r>
+              <a:rPr lang="en-GB" sz="2200" dirty="0"/>
+              <a:t>Need a tool that is…</a:t>
+            </a:r>
+          </a:p>
+          <a:p>
+            <a:r>
+              <a:rPr lang="en-GB" sz="2200" dirty="0"/>
+              <a:t>Language agnostic</a:t>
+            </a:r>
+          </a:p>
+          <a:p>
+            <a:r>
+              <a:rPr lang="en-GB" sz="2200" dirty="0"/>
+              <a:t>Low effort</a:t>
+            </a:r>
+          </a:p>
+          <a:p>
+            <a:r>
+              <a:rPr lang="en-GB" sz="2200" dirty="0"/>
+              <a:t>Flexible</a:t>
+            </a:r>
+          </a:p>
+          <a:p>
+            <a:r>
+              <a:rPr lang="en-GB" sz="2200" dirty="0"/>
+              <a:t>Considers all the “ingredients” of an analysis</a:t>
+            </a:r>
+          </a:p>
+          <a:p>
+            <a:pPr lvl="1"/>
+            <a:r>
+              <a:rPr lang="en-GB" sz="1900" dirty="0"/>
+              <a:t>Data</a:t>
+            </a:r>
+          </a:p>
+          <a:p>
+            <a:pPr lvl="1"/>
+            <a:r>
+              <a:rPr lang="en-GB" sz="1900" dirty="0"/>
+              <a:t>Code</a:t>
+            </a:r>
+          </a:p>
+          <a:p>
+            <a:pPr lvl="1"/>
+            <a:r>
+              <a:rPr lang="en-GB" sz="1900" dirty="0"/>
+              <a:t>Outputs</a:t>
+            </a:r>
+            <a:endParaRPr lang="en-GB" dirty="0"/>
+          </a:p>
+        </p:txBody>
+      </p:sp>
+    </p:spTree>
+    <p:extLst>
+      <p:ext uri="{BB962C8B-B14F-4D97-AF65-F5344CB8AC3E}">
+        <p14:creationId xmlns:p14="http://schemas.microsoft.com/office/powerpoint/2010/main" val="992821041"/>
+      </p:ext>
+    </p:extLst>
+  </p:cSld>
+  <p:clrMapOvr>
+    <a:masterClrMapping/>
+  </p:clrMapOvr>
+</p:sld>
+</file>
+
+<file path=ppt/slides/slide11.xml><?xml version="1.0" encoding="utf-8"?>
+<p:sld xmlns:a="http://schemas.openxmlformats.org/drawingml/2006/main" xmlns:r="http://schemas.openxmlformats.org/officeDocument/2006/relationships" xmlns:p="http://schemas.openxmlformats.org/presentationml/2006/main">
+  <p:cSld>
+    <p:spTree>
+      <p:nvGrpSpPr>
+        <p:cNvPr id="1" name=""/>
+        <p:cNvGrpSpPr/>
+        <p:nvPr/>
+      </p:nvGrpSpPr>
+      <p:grpSpPr>
+        <a:xfrm>
+          <a:off x="0" y="0"/>
+          <a:ext cx="0" cy="0"/>
+          <a:chOff x="0" y="0"/>
+          <a:chExt cx="0" cy="0"/>
+        </a:xfrm>
+      </p:grpSpPr>
+      <p:sp>
+        <p:nvSpPr>
+          <p:cNvPr id="2" name="Title 1">
+            <a:extLst>
+              <a:ext uri="{FF2B5EF4-FFF2-40B4-BE49-F238E27FC236}">
+                <a16:creationId xmlns:a16="http://schemas.microsoft.com/office/drawing/2014/main" id="{4A25B60E-A43F-D543-9027-0562192716AD}"/>
+              </a:ext>
+            </a:extLst>
+          </p:cNvPr>
+          <p:cNvSpPr>
+            <a:spLocks noGrp="1"/>
+          </p:cNvSpPr>
+          <p:nvPr>
+            <p:ph type="title"/>
+          </p:nvPr>
+        </p:nvSpPr>
+        <p:spPr/>
+        <p:txBody>
+          <a:bodyPr/>
+          <a:lstStyle/>
+          <a:p>
+            <a:r>
+              <a:rPr lang="en-GB" dirty="0"/>
+              <a:t>repro-catalogue</a:t>
+            </a:r>
+          </a:p>
+        </p:txBody>
+      </p:sp>
+      <p:sp>
+        <p:nvSpPr>
+          <p:cNvPr id="3" name="Content Placeholder 2">
+            <a:extLst>
+              <a:ext uri="{FF2B5EF4-FFF2-40B4-BE49-F238E27FC236}">
+                <a16:creationId xmlns:a16="http://schemas.microsoft.com/office/drawing/2014/main" id="{526FB2AF-66A8-C643-BC47-D7FB11053551}"/>
+              </a:ext>
+            </a:extLst>
+          </p:cNvPr>
+          <p:cNvSpPr>
+            <a:spLocks noGrp="1"/>
+          </p:cNvSpPr>
+          <p:nvPr>
+            <p:ph idx="1"/>
+          </p:nvPr>
+        </p:nvSpPr>
+        <p:spPr/>
+        <p:txBody>
+          <a:bodyPr>
+            <a:normAutofit/>
+          </a:bodyPr>
+          <a:lstStyle/>
+          <a:p>
+            <a:r>
+              <a:rPr lang="en-GB" sz="2000" dirty="0"/>
+              <a:t>Python package</a:t>
+            </a:r>
+          </a:p>
+          <a:p>
+            <a:r>
+              <a:rPr lang="en-GB" sz="2000" dirty="0"/>
+              <a:t>Integrates into existing scripted workflow</a:t>
+            </a:r>
+          </a:p>
+          <a:p>
+            <a:r>
+              <a:rPr lang="en-GB" sz="2000" dirty="0"/>
+              <a:t>Identifies changes in input data, code and outputs</a:t>
+            </a:r>
+          </a:p>
+          <a:p>
+            <a:r>
+              <a:rPr lang="en-GB" sz="2000" dirty="0"/>
+              <a:t>Produces a short report</a:t>
+            </a:r>
+          </a:p>
+        </p:txBody>
+      </p:sp>
+      <p:pic>
+        <p:nvPicPr>
+          <p:cNvPr id="5" name="Picture 4">
+            <a:extLst>
+              <a:ext uri="{FF2B5EF4-FFF2-40B4-BE49-F238E27FC236}">
+                <a16:creationId xmlns:a16="http://schemas.microsoft.com/office/drawing/2014/main" id="{2B19420A-53E4-4242-8E3B-38AEBD03DDD2}"/>
+              </a:ext>
+            </a:extLst>
+          </p:cNvPr>
+          <p:cNvPicPr>
+            <a:picLocks noChangeAspect="1"/>
+          </p:cNvPicPr>
+          <p:nvPr/>
+        </p:nvPicPr>
+        <p:blipFill>
+          <a:blip r:embed="rId2"/>
+          <a:stretch>
+            <a:fillRect/>
+          </a:stretch>
+        </p:blipFill>
+        <p:spPr>
+          <a:xfrm>
+            <a:off x="6822589" y="122663"/>
+            <a:ext cx="5262939" cy="1248938"/>
+          </a:xfrm>
+          <a:prstGeom prst="rect">
+            <a:avLst/>
+          </a:prstGeom>
+        </p:spPr>
+      </p:pic>
+      <p:pic>
+        <p:nvPicPr>
+          <p:cNvPr id="7" name="Picture 6">
+            <a:extLst>
+              <a:ext uri="{FF2B5EF4-FFF2-40B4-BE49-F238E27FC236}">
+                <a16:creationId xmlns:a16="http://schemas.microsoft.com/office/drawing/2014/main" id="{A5D504DB-9CF2-C440-9D9F-BFECD523D205}"/>
+              </a:ext>
+            </a:extLst>
+          </p:cNvPr>
+          <p:cNvPicPr>
+            <a:picLocks noChangeAspect="1"/>
+          </p:cNvPicPr>
+          <p:nvPr/>
+        </p:nvPicPr>
+        <p:blipFill>
+          <a:blip r:embed="rId3"/>
+          <a:stretch>
+            <a:fillRect/>
+          </a:stretch>
+        </p:blipFill>
+        <p:spPr>
+          <a:xfrm>
+            <a:off x="6096000" y="3670300"/>
+            <a:ext cx="5837416" cy="2946400"/>
+          </a:xfrm>
+          <a:prstGeom prst="rect">
+            <a:avLst/>
+          </a:prstGeom>
+        </p:spPr>
+      </p:pic>
+      <p:pic>
+        <p:nvPicPr>
+          <p:cNvPr id="9" name="Picture 8">
+            <a:extLst>
+              <a:ext uri="{FF2B5EF4-FFF2-40B4-BE49-F238E27FC236}">
+                <a16:creationId xmlns:a16="http://schemas.microsoft.com/office/drawing/2014/main" id="{D8759C44-143C-E140-A781-C5F3A879F2F4}"/>
+              </a:ext>
+            </a:extLst>
+          </p:cNvPr>
+          <p:cNvPicPr>
+            <a:picLocks noChangeAspect="1"/>
+          </p:cNvPicPr>
+          <p:nvPr/>
+        </p:nvPicPr>
+        <p:blipFill>
+          <a:blip r:embed="rId4"/>
+          <a:stretch>
+            <a:fillRect/>
+          </a:stretch>
+        </p:blipFill>
+        <p:spPr>
+          <a:xfrm>
+            <a:off x="1972084" y="4105656"/>
+            <a:ext cx="3868475" cy="2511044"/>
+          </a:xfrm>
+          <a:prstGeom prst="rect">
+            <a:avLst/>
+          </a:prstGeom>
+        </p:spPr>
+      </p:pic>
+    </p:spTree>
+    <p:extLst>
+      <p:ext uri="{BB962C8B-B14F-4D97-AF65-F5344CB8AC3E}">
+        <p14:creationId xmlns:p14="http://schemas.microsoft.com/office/powerpoint/2010/main" val="575614200"/>
       </p:ext>
     </p:extLst>
   </p:cSld>
@@ -30138,10 +30491,351 @@
           </a:p>
         </p:txBody>
       </p:sp>
+      <p:sp>
+        <p:nvSpPr>
+          <p:cNvPr id="59" name="Rectangle 58">
+            <a:extLst>
+              <a:ext uri="{FF2B5EF4-FFF2-40B4-BE49-F238E27FC236}">
+                <a16:creationId xmlns:a16="http://schemas.microsoft.com/office/drawing/2014/main" id="{0B93DEC3-B0AB-D248-B4AF-09FB8F7338DC}"/>
+              </a:ext>
+            </a:extLst>
+          </p:cNvPr>
+          <p:cNvSpPr/>
+          <p:nvPr/>
+        </p:nvSpPr>
+        <p:spPr>
+          <a:xfrm>
+            <a:off x="5974813" y="3244334"/>
+            <a:ext cx="242374" cy="369332"/>
+          </a:xfrm>
+          <a:prstGeom prst="rect">
+            <a:avLst/>
+          </a:prstGeom>
+        </p:spPr>
+        <p:txBody>
+          <a:bodyPr wrap="none">
+            <a:spAutoFit/>
+          </a:bodyPr>
+          <a:lstStyle/>
+          <a:p>
+            <a:r>
+              <a:rPr lang="en-GB" dirty="0">
+                <a:solidFill>
+                  <a:srgbClr val="000000"/>
+                </a:solidFill>
+                <a:latin typeface="Times" pitchFamily="2" charset="0"/>
+              </a:rPr>
+              <a:t> </a:t>
+            </a:r>
+            <a:endParaRPr lang="en-US" dirty="0"/>
+          </a:p>
+        </p:txBody>
+      </p:sp>
     </p:spTree>
     <p:extLst>
       <p:ext uri="{BB962C8B-B14F-4D97-AF65-F5344CB8AC3E}">
         <p14:creationId xmlns:p14="http://schemas.microsoft.com/office/powerpoint/2010/main" val="3325865877"/>
+      </p:ext>
+    </p:extLst>
+  </p:cSld>
+  <p:clrMapOvr>
+    <a:masterClrMapping/>
+  </p:clrMapOvr>
+</p:sld>
+</file>
+
+<file path=ppt/slides/slide9.xml><?xml version="1.0" encoding="utf-8"?>
+<p:sld xmlns:a="http://schemas.openxmlformats.org/drawingml/2006/main" xmlns:r="http://schemas.openxmlformats.org/officeDocument/2006/relationships" xmlns:p="http://schemas.openxmlformats.org/presentationml/2006/main">
+  <p:cSld>
+    <p:spTree>
+      <p:nvGrpSpPr>
+        <p:cNvPr id="1" name=""/>
+        <p:cNvGrpSpPr/>
+        <p:nvPr/>
+      </p:nvGrpSpPr>
+      <p:grpSpPr>
+        <a:xfrm>
+          <a:off x="0" y="0"/>
+          <a:ext cx="0" cy="0"/>
+          <a:chOff x="0" y="0"/>
+          <a:chExt cx="0" cy="0"/>
+        </a:xfrm>
+      </p:grpSpPr>
+      <p:sp>
+        <p:nvSpPr>
+          <p:cNvPr id="2" name="Title 1">
+            <a:extLst>
+              <a:ext uri="{FF2B5EF4-FFF2-40B4-BE49-F238E27FC236}">
+                <a16:creationId xmlns:a16="http://schemas.microsoft.com/office/drawing/2014/main" id="{FED29943-5E82-E746-95FA-C065E94F4503}"/>
+              </a:ext>
+            </a:extLst>
+          </p:cNvPr>
+          <p:cNvSpPr>
+            <a:spLocks noGrp="1"/>
+          </p:cNvSpPr>
+          <p:nvPr>
+            <p:ph type="title"/>
+          </p:nvPr>
+        </p:nvSpPr>
+        <p:spPr/>
+        <p:txBody>
+          <a:bodyPr/>
+          <a:lstStyle/>
+          <a:p>
+            <a:r>
+              <a:rPr lang="en-GB" dirty="0"/>
+              <a:t>Reproducibility in DECOVID</a:t>
+            </a:r>
+          </a:p>
+        </p:txBody>
+      </p:sp>
+      <p:pic>
+        <p:nvPicPr>
+          <p:cNvPr id="5" name="Picture 4">
+            <a:extLst>
+              <a:ext uri="{FF2B5EF4-FFF2-40B4-BE49-F238E27FC236}">
+                <a16:creationId xmlns:a16="http://schemas.microsoft.com/office/drawing/2014/main" id="{261EADA9-49AF-C847-89CA-FDDDCB76C83E}"/>
+              </a:ext>
+            </a:extLst>
+          </p:cNvPr>
+          <p:cNvPicPr>
+            <a:picLocks noChangeAspect="1"/>
+          </p:cNvPicPr>
+          <p:nvPr/>
+        </p:nvPicPr>
+        <p:blipFill>
+          <a:blip r:embed="rId2"/>
+          <a:stretch>
+            <a:fillRect/>
+          </a:stretch>
+        </p:blipFill>
+        <p:spPr>
+          <a:xfrm>
+            <a:off x="4557966" y="2796466"/>
+            <a:ext cx="6907066" cy="3553274"/>
+          </a:xfrm>
+          <a:prstGeom prst="rect">
+            <a:avLst/>
+          </a:prstGeom>
+        </p:spPr>
+      </p:pic>
+      <p:sp>
+        <p:nvSpPr>
+          <p:cNvPr id="6" name="TextBox 5">
+            <a:extLst>
+              <a:ext uri="{FF2B5EF4-FFF2-40B4-BE49-F238E27FC236}">
+                <a16:creationId xmlns:a16="http://schemas.microsoft.com/office/drawing/2014/main" id="{DF274AD9-93DD-DA45-A276-C8F9C5AA9008}"/>
+              </a:ext>
+            </a:extLst>
+          </p:cNvPr>
+          <p:cNvSpPr txBox="1"/>
+          <p:nvPr/>
+        </p:nvSpPr>
+        <p:spPr>
+          <a:xfrm>
+            <a:off x="1465465" y="5848632"/>
+            <a:ext cx="3110147" cy="584775"/>
+          </a:xfrm>
+          <a:prstGeom prst="rect">
+            <a:avLst/>
+          </a:prstGeom>
+          <a:noFill/>
+        </p:spPr>
+        <p:txBody>
+          <a:bodyPr wrap="none" rtlCol="0">
+            <a:spAutoFit/>
+          </a:bodyPr>
+          <a:lstStyle/>
+          <a:p>
+            <a:pPr algn="r"/>
+            <a:r>
+              <a:rPr lang="en-GB" sz="1600" dirty="0"/>
+              <a:t>The Turing Way</a:t>
+            </a:r>
+          </a:p>
+          <a:p>
+            <a:pPr algn="r"/>
+            <a:r>
+              <a:rPr lang="en-GB" sz="1600" dirty="0"/>
+              <a:t>DOI: 10.5281/zenodo.3233986</a:t>
+            </a:r>
+          </a:p>
+        </p:txBody>
+      </p:sp>
+      <p:sp>
+        <p:nvSpPr>
+          <p:cNvPr id="3" name="Bent Arrow 2">
+            <a:extLst>
+              <a:ext uri="{FF2B5EF4-FFF2-40B4-BE49-F238E27FC236}">
+                <a16:creationId xmlns:a16="http://schemas.microsoft.com/office/drawing/2014/main" id="{1A5A8456-99A1-AF43-B5E6-B5EC47D99528}"/>
+              </a:ext>
+            </a:extLst>
+          </p:cNvPr>
+          <p:cNvSpPr/>
+          <p:nvPr/>
+        </p:nvSpPr>
+        <p:spPr>
+          <a:xfrm rot="5400000">
+            <a:off x="7861300" y="1562100"/>
+            <a:ext cx="965200" cy="1447800"/>
+          </a:xfrm>
+          <a:prstGeom prst="bentArrow">
+            <a:avLst/>
+          </a:prstGeom>
+        </p:spPr>
+        <p:style>
+          <a:lnRef idx="2">
+            <a:schemeClr val="accent1">
+              <a:shade val="50000"/>
+            </a:schemeClr>
+          </a:lnRef>
+          <a:fillRef idx="1">
+            <a:schemeClr val="accent1"/>
+          </a:fillRef>
+          <a:effectRef idx="0">
+            <a:schemeClr val="accent1"/>
+          </a:effectRef>
+          <a:fontRef idx="minor">
+            <a:schemeClr val="lt1"/>
+          </a:fontRef>
+        </p:style>
+        <p:txBody>
+          <a:bodyPr rtlCol="0" anchor="ctr"/>
+          <a:lstStyle/>
+          <a:p>
+            <a:pPr algn="ctr"/>
+            <a:endParaRPr lang="en-GB">
+              <a:solidFill>
+                <a:schemeClr val="tx1"/>
+              </a:solidFill>
+            </a:endParaRPr>
+          </a:p>
+        </p:txBody>
+      </p:sp>
+      <p:sp>
+        <p:nvSpPr>
+          <p:cNvPr id="7" name="Bent Arrow 6">
+            <a:extLst>
+              <a:ext uri="{FF2B5EF4-FFF2-40B4-BE49-F238E27FC236}">
+                <a16:creationId xmlns:a16="http://schemas.microsoft.com/office/drawing/2014/main" id="{F204A618-3219-9345-81D9-307F044ACACD}"/>
+              </a:ext>
+            </a:extLst>
+          </p:cNvPr>
+          <p:cNvSpPr/>
+          <p:nvPr/>
+        </p:nvSpPr>
+        <p:spPr>
+          <a:xfrm rot="10800000" flipH="1">
+            <a:off x="3441700" y="3213100"/>
+            <a:ext cx="965200" cy="2286000"/>
+          </a:xfrm>
+          <a:prstGeom prst="bentArrow">
+            <a:avLst/>
+          </a:prstGeom>
+        </p:spPr>
+        <p:style>
+          <a:lnRef idx="2">
+            <a:schemeClr val="accent1">
+              <a:shade val="50000"/>
+            </a:schemeClr>
+          </a:lnRef>
+          <a:fillRef idx="1">
+            <a:schemeClr val="accent1"/>
+          </a:fillRef>
+          <a:effectRef idx="0">
+            <a:schemeClr val="accent1"/>
+          </a:effectRef>
+          <a:fontRef idx="minor">
+            <a:schemeClr val="lt1"/>
+          </a:fontRef>
+        </p:style>
+        <p:txBody>
+          <a:bodyPr rtlCol="0" anchor="ctr"/>
+          <a:lstStyle/>
+          <a:p>
+            <a:pPr algn="ctr"/>
+            <a:endParaRPr lang="en-GB">
+              <a:solidFill>
+                <a:schemeClr val="tx1"/>
+              </a:solidFill>
+            </a:endParaRPr>
+          </a:p>
+        </p:txBody>
+      </p:sp>
+      <p:sp>
+        <p:nvSpPr>
+          <p:cNvPr id="4" name="TextBox 3">
+            <a:extLst>
+              <a:ext uri="{FF2B5EF4-FFF2-40B4-BE49-F238E27FC236}">
+                <a16:creationId xmlns:a16="http://schemas.microsoft.com/office/drawing/2014/main" id="{BFEE0F07-8EF9-704F-83B9-C0051801BB71}"/>
+              </a:ext>
+            </a:extLst>
+          </p:cNvPr>
+          <p:cNvSpPr txBox="1"/>
+          <p:nvPr/>
+        </p:nvSpPr>
+        <p:spPr>
+          <a:xfrm>
+            <a:off x="2226982" y="1909482"/>
+            <a:ext cx="2734982" cy="1200329"/>
+          </a:xfrm>
+          <a:prstGeom prst="rect">
+            <a:avLst/>
+          </a:prstGeom>
+          <a:noFill/>
+        </p:spPr>
+        <p:txBody>
+          <a:bodyPr wrap="square" rtlCol="0">
+            <a:spAutoFit/>
+          </a:bodyPr>
+          <a:lstStyle/>
+          <a:p>
+            <a:r>
+              <a:rPr lang="en-GB" dirty="0"/>
+              <a:t>Choices made by the analysists, represented in a piece of software to perform the analysis</a:t>
+            </a:r>
+          </a:p>
+        </p:txBody>
+      </p:sp>
+      <p:sp>
+        <p:nvSpPr>
+          <p:cNvPr id="8" name="TextBox 7">
+            <a:extLst>
+              <a:ext uri="{FF2B5EF4-FFF2-40B4-BE49-F238E27FC236}">
+                <a16:creationId xmlns:a16="http://schemas.microsoft.com/office/drawing/2014/main" id="{6FC84F12-AD51-924A-B849-05924FBABAA3}"/>
+              </a:ext>
+            </a:extLst>
+          </p:cNvPr>
+          <p:cNvSpPr txBox="1"/>
+          <p:nvPr/>
+        </p:nvSpPr>
+        <p:spPr>
+          <a:xfrm>
+            <a:off x="5857689" y="1364875"/>
+            <a:ext cx="1917701" cy="1200329"/>
+          </a:xfrm>
+          <a:prstGeom prst="rect">
+            <a:avLst/>
+          </a:prstGeom>
+          <a:noFill/>
+        </p:spPr>
+        <p:txBody>
+          <a:bodyPr wrap="square" rtlCol="0">
+            <a:spAutoFit/>
+          </a:bodyPr>
+          <a:lstStyle/>
+          <a:p>
+            <a:r>
+              <a:rPr lang="en-GB" dirty="0"/>
+              <a:t>Everything else that is not in the control of the analysts</a:t>
+            </a:r>
+          </a:p>
+        </p:txBody>
+      </p:sp>
+    </p:spTree>
+    <p:extLst>
+      <p:ext uri="{BB962C8B-B14F-4D97-AF65-F5344CB8AC3E}">
+        <p14:creationId xmlns:p14="http://schemas.microsoft.com/office/powerpoint/2010/main" val="1408197130"/>
       </p:ext>
     </p:extLst>
   </p:cSld>

</xml_diff>